<commit_message>
Dodanie opisu SW dla front-endu
</commit_message>
<xml_diff>
--- a/Prezentacja_końcowa/ESP8266_Silnik_krokowy.pptx
+++ b/Prezentacja_końcowa/ESP8266_Silnik_krokowy.pptx
@@ -252,7 +252,38 @@
       </a:defRPr>
     </a:lvl9pPr>
   </p:defaultTextStyle>
+  <p:extLst>
+    <p:ext uri="{EFAFB233-063F-42B5-8137-9DF3F51BA10A}">
+      <p15:sldGuideLst xmlns:p15="http://schemas.microsoft.com/office/powerpoint/2012/main"/>
+    </p:ext>
+  </p:extLst>
 </p:presentation>
+</file>
+
+<file path=ppt/commentAuthors.xml><?xml version="1.0" encoding="utf-8"?>
+<p:cmAuthorLst xmlns:a="http://schemas.openxmlformats.org/drawingml/2006/main" xmlns:r="http://schemas.openxmlformats.org/officeDocument/2006/relationships" xmlns:p="http://schemas.openxmlformats.org/presentationml/2006/main">
+  <p:cmAuthor id="1" name="Grzegorz Woźny" initials="GW" lastIdx="2" clrIdx="0">
+    <p:extLst>
+      <p:ext uri="{19B8F6BF-5375-455C-9EA6-DF929625EA0E}">
+        <p15:presenceInfo xmlns:p15="http://schemas.microsoft.com/office/powerpoint/2012/main" userId="27b2cee81066ad9e" providerId="Windows Live"/>
+      </p:ext>
+    </p:extLst>
+  </p:cmAuthor>
+</p:cmAuthorLst>
+</file>
+
+<file path=ppt/comments/comment1.xml><?xml version="1.0" encoding="utf-8"?>
+<p:cmLst xmlns:a="http://schemas.openxmlformats.org/drawingml/2006/main" xmlns:r="http://schemas.openxmlformats.org/officeDocument/2006/relationships" xmlns:p="http://schemas.openxmlformats.org/presentationml/2006/main">
+  <p:cm authorId="1" dt="2019-06-03T22:19:23.468" idx="1">
+    <p:pos x="1836" y="1428"/>
+    <p:text>Może lepiej: "Program drugi wysterowywuje silnik krokowy"</p:text>
+    <p:extLst>
+      <p:ext uri="{C676402C-5697-4E1C-873F-D02D1690AC5C}">
+        <p15:threadingInfo xmlns:p15="http://schemas.microsoft.com/office/powerpoint/2012/main" timeZoneBias="-120"/>
+      </p:ext>
+    </p:extLst>
+  </p:cm>
+</p:cmLst>
 </file>
 
 <file path=ppt/notesMasters/notesMaster1.xml><?xml version="1.0" encoding="utf-8"?>
@@ -1718,11 +1749,11 @@
               <a:buNone/>
             </a:pPr>
             <a:r>
-              <a:rPr lang="pl-PL" dirty="0" smtClean="0"/>
+              <a:rPr lang="pl-PL" dirty="0"/>
               <a:t>Brak groźby do wielokrotnego</a:t>
             </a:r>
             <a:r>
-              <a:rPr lang="pl-PL" baseline="0" dirty="0" smtClean="0"/>
+              <a:rPr lang="pl-PL" baseline="0" dirty="0"/>
               <a:t> dostępu do zmiennej w jednym czasie</a:t>
             </a:r>
             <a:endParaRPr dirty="0"/>
@@ -1830,7 +1861,7 @@
               <a:buNone/>
             </a:pPr>
             <a:r>
-              <a:rPr lang="pl-PL" dirty="0" smtClean="0">
+              <a:rPr lang="pl-PL" dirty="0">
                 <a:hlinkClick r:id="rId3"/>
               </a:rPr>
               <a:t>https://www.geeksforgeeks.org/coroutine-in-python/</a:t>
@@ -2001,6 +2032,149 @@
 </p:notes>
 </file>
 
+<file path=ppt/notesSlides/notesSlide6.xml><?xml version="1.0" encoding="utf-8"?>
+<p:notes xmlns:a="http://schemas.openxmlformats.org/drawingml/2006/main" xmlns:r="http://schemas.openxmlformats.org/officeDocument/2006/relationships" xmlns:p="http://schemas.openxmlformats.org/presentationml/2006/main">
+  <p:cSld>
+    <p:spTree>
+      <p:nvGrpSpPr>
+        <p:cNvPr id="1" name=""/>
+        <p:cNvGrpSpPr/>
+        <p:nvPr/>
+      </p:nvGrpSpPr>
+      <p:grpSpPr>
+        <a:xfrm>
+          <a:off x="0" y="0"/>
+          <a:ext cx="0" cy="0"/>
+          <a:chOff x="0" y="0"/>
+          <a:chExt cx="0" cy="0"/>
+        </a:xfrm>
+      </p:grpSpPr>
+      <p:sp>
+        <p:nvSpPr>
+          <p:cNvPr id="2" name="Symbol zastępczy obrazu slajdu 1"/>
+          <p:cNvSpPr>
+            <a:spLocks noGrp="1" noRot="1" noChangeAspect="1"/>
+          </p:cNvSpPr>
+          <p:nvPr>
+            <p:ph type="sldImg"/>
+          </p:nvPr>
+        </p:nvSpPr>
+        <p:spPr>
+          <a:xfrm>
+            <a:off x="919163" y="744538"/>
+            <a:ext cx="4959350" cy="3721100"/>
+          </a:xfrm>
+        </p:spPr>
+      </p:sp>
+      <p:sp>
+        <p:nvSpPr>
+          <p:cNvPr id="3" name="Symbol zastępczy notatek 2"/>
+          <p:cNvSpPr>
+            <a:spLocks noGrp="1"/>
+          </p:cNvSpPr>
+          <p:nvPr>
+            <p:ph type="body" idx="1"/>
+          </p:nvPr>
+        </p:nvSpPr>
+        <p:spPr/>
+        <p:txBody>
+          <a:bodyPr/>
+          <a:lstStyle/>
+          <a:p>
+            <a:r>
+              <a:rPr lang="pl-PL" sz="1800" dirty="0" err="1">
+                <a:latin typeface="Lucida Console" panose="020B0609040504020204" pitchFamily="49" charset="0"/>
+              </a:rPr>
+              <a:t>Stringify</a:t>
+            </a:r>
+            <a:r>
+              <a:rPr lang="pl-PL" sz="1800" dirty="0">
+                <a:latin typeface="Lucida Console" panose="020B0609040504020204" pitchFamily="49" charset="0"/>
+              </a:rPr>
+              <a:t>: JS-&gt;JSON, != </a:t>
+            </a:r>
+            <a:r>
+              <a:rPr lang="pl-PL" sz="1800" dirty="0" err="1">
+                <a:latin typeface="Lucida Console" panose="020B0609040504020204" pitchFamily="49" charset="0"/>
+              </a:rPr>
+              <a:t>parse</a:t>
+            </a:r>
+            <a:r>
+              <a:rPr lang="pl-PL" sz="1800" dirty="0">
+                <a:latin typeface="Lucida Console" panose="020B0609040504020204" pitchFamily="49" charset="0"/>
+              </a:rPr>
+              <a:t> JSON-&gt;JS</a:t>
+            </a:r>
+          </a:p>
+          <a:p>
+            <a:r>
+              <a:rPr lang="pl-PL" dirty="0"/>
+              <a:t>https://regexr.com</a:t>
+            </a:r>
+          </a:p>
+        </p:txBody>
+      </p:sp>
+      <p:sp>
+        <p:nvSpPr>
+          <p:cNvPr id="4" name="Symbol zastępczy numeru slajdu 3"/>
+          <p:cNvSpPr>
+            <a:spLocks noGrp="1"/>
+          </p:cNvSpPr>
+          <p:nvPr>
+            <p:ph type="sldNum" idx="12"/>
+          </p:nvPr>
+        </p:nvSpPr>
+        <p:spPr/>
+        <p:txBody>
+          <a:bodyPr/>
+          <a:lstStyle/>
+          <a:p>
+            <a:pPr marL="0" marR="0" lvl="0" indent="0" algn="r" rtl="0">
+              <a:lnSpc>
+                <a:spcPct val="100000"/>
+              </a:lnSpc>
+              <a:spcBef>
+                <a:spcPts val="0"/>
+              </a:spcBef>
+              <a:spcAft>
+                <a:spcPts val="0"/>
+              </a:spcAft>
+              <a:buClr>
+                <a:srgbClr val="000000"/>
+              </a:buClr>
+              <a:buSzPts val="1300"/>
+              <a:buFont typeface="Arial"/>
+              <a:buNone/>
+            </a:pPr>
+            <a:fld id="{00000000-1234-1234-1234-123412341234}" type="slidenum">
+              <a:rPr lang="en-US" sz="1300" b="0" i="0" u="none" strike="noStrike" cap="none" smtClean="0">
+                <a:solidFill>
+                  <a:srgbClr val="000000"/>
+                </a:solidFill>
+                <a:latin typeface="Arial"/>
+                <a:ea typeface="Arial"/>
+                <a:cs typeface="Arial"/>
+                <a:sym typeface="Arial"/>
+              </a:rPr>
+              <a:t>9</a:t>
+            </a:fld>
+            <a:endParaRPr lang="en-US"/>
+          </a:p>
+        </p:txBody>
+      </p:sp>
+    </p:spTree>
+    <p:extLst>
+      <p:ext uri="{BB962C8B-B14F-4D97-AF65-F5344CB8AC3E}">
+        <p14:creationId xmlns:p14="http://schemas.microsoft.com/office/powerpoint/2010/main" val="3963701241"/>
+      </p:ext>
+    </p:extLst>
+  </p:cSld>
+  <p:clrMapOvr>
+    <a:masterClrMapping/>
+  </p:clrMapOvr>
+</p:notes>
+</file>
+
 <file path=ppt/slideLayouts/slideLayout1.xml><?xml version="1.0" encoding="utf-8"?>
 <p:sldLayout xmlns:a="http://schemas.openxmlformats.org/drawingml/2006/main" xmlns:r="http://schemas.openxmlformats.org/officeDocument/2006/relationships" xmlns:p="http://schemas.openxmlformats.org/presentationml/2006/main" matchingName="Slajd tytułowy">
   <p:cSld name="Slajd tytułowy">
@@ -6759,10 +6933,9 @@
           <a:lstStyle/>
           <a:p>
             <a:r>
-              <a:rPr lang="pl-PL" sz="3600" b="1" dirty="0" smtClean="0"/>
+              <a:rPr lang="pl-PL" sz="3600" b="1" dirty="0"/>
               <a:t>Efekt końcowy – front – end strony WWW</a:t>
             </a:r>
-            <a:endParaRPr lang="pl-PL" sz="3600" b="1" dirty="0"/>
           </a:p>
         </p:txBody>
       </p:sp>
@@ -6906,11 +7079,7 @@
             </a:pPr>
             <a:r>
               <a:rPr lang="pl-PL" dirty="0"/>
-              <a:t>https://</a:t>
-            </a:r>
-            <a:r>
-              <a:rPr lang="pl-PL" dirty="0" smtClean="0"/>
-              <a:t>docs.python.org/3/library/asyncio-task.html</a:t>
+              <a:t>https://docs.python.org/3/library/asyncio-task.html</a:t>
             </a:r>
           </a:p>
           <a:p>
@@ -6919,11 +7088,7 @@
             </a:pPr>
             <a:r>
               <a:rPr lang="pl-PL" dirty="0"/>
-              <a:t>https://</a:t>
-            </a:r>
-            <a:r>
-              <a:rPr lang="pl-PL" dirty="0" smtClean="0"/>
-              <a:t>github.com/peterhinch/micropython-async/blob/master/TUTORIAL.md</a:t>
+              <a:t>https://github.com/peterhinch/micropython-async/blob/master/TUTORIAL.md</a:t>
             </a:r>
           </a:p>
           <a:p>
@@ -6941,11 +7106,7 @@
             </a:pPr>
             <a:r>
               <a:rPr lang="pl-PL" dirty="0"/>
-              <a:t>https://</a:t>
-            </a:r>
-            <a:r>
-              <a:rPr lang="pl-PL" dirty="0" smtClean="0"/>
-              <a:t>botland.com.pl/pl/moduly-wifi/8241-modul-wifi-esp8266-nodemcu-v3.html</a:t>
+              <a:t>https://botland.com.pl/pl/moduly-wifi/8241-modul-wifi-esp8266-nodemcu-v3.html</a:t>
             </a:r>
           </a:p>
           <a:p>
@@ -6954,18 +7115,14 @@
             </a:pPr>
             <a:r>
               <a:rPr lang="pl-PL" dirty="0"/>
-              <a:t>https://</a:t>
-            </a:r>
-            <a:r>
-              <a:rPr lang="pl-PL" dirty="0" smtClean="0"/>
-              <a:t>botland.com.pl/pl/silniki-krokowe/3480-silnik-krokowy-z-przekladnia-28byj-48-5v-01a-003nm-ze-sterownikiem-uln2003-5903351241458.html</a:t>
+              <a:t>https://botland.com.pl/pl/silniki-krokowe/3480-silnik-krokowy-z-przekladnia-28byj-48-5v-01a-003nm-ze-sterownikiem-uln2003-5903351241458.html</a:t>
             </a:r>
           </a:p>
           <a:p>
             <a:pPr marL="50800" indent="0" algn="just">
               <a:buNone/>
             </a:pPr>
-            <a:endParaRPr lang="pl-PL" u="sng" dirty="0" smtClean="0"/>
+            <a:endParaRPr lang="pl-PL" u="sng" dirty="0"/>
           </a:p>
           <a:p>
             <a:pPr marL="50800" indent="0" algn="just">
@@ -6997,10 +7154,9 @@
           <a:p>
             <a:pPr algn="ctr"/>
             <a:r>
-              <a:rPr lang="pl-PL" sz="3600" b="1" dirty="0" smtClean="0"/>
+              <a:rPr lang="pl-PL" sz="3600" b="1" dirty="0"/>
               <a:t>Bibliografia</a:t>
             </a:r>
-            <a:endParaRPr lang="pl-PL" sz="3600" b="1" dirty="0"/>
           </a:p>
         </p:txBody>
       </p:sp>
@@ -7059,7 +7215,7 @@
           <a:p>
             <a:pPr algn="ctr"/>
             <a:r>
-              <a:rPr lang="pl-PL" dirty="0" smtClean="0"/>
+              <a:rPr lang="pl-PL" dirty="0"/>
               <a:t>Plan prezentacji</a:t>
             </a:r>
           </a:p>
@@ -7347,31 +7503,13 @@
               <a:buChar char="•"/>
             </a:pPr>
             <a:r>
-              <a:rPr lang="pl-PL" sz="2400" dirty="0" smtClean="0">
-                <a:latin typeface="Arial"/>
-                <a:ea typeface="Arial"/>
-                <a:cs typeface="Arial"/>
-                <a:sym typeface="Arial"/>
-              </a:rPr>
-              <a:t>Cel i zało</a:t>
-            </a:r>
-            <a:r>
               <a:rPr lang="pl-PL" sz="2400" dirty="0">
                 <a:latin typeface="Arial"/>
                 <a:ea typeface="Arial"/>
                 <a:cs typeface="Arial"/>
                 <a:sym typeface="Arial"/>
               </a:rPr>
-              <a:t>żenia</a:t>
-            </a:r>
-            <a:r>
-              <a:rPr lang="pl-PL" sz="2400" dirty="0" smtClean="0">
-                <a:latin typeface="Arial"/>
-                <a:ea typeface="Arial"/>
-                <a:cs typeface="Arial"/>
-                <a:sym typeface="Arial"/>
-              </a:rPr>
-              <a:t> projektu</a:t>
+              <a:t>Cel i założenia projektu</a:t>
             </a:r>
           </a:p>
           <a:p>
@@ -7384,31 +7522,13 @@
               <a:buChar char="•"/>
             </a:pPr>
             <a:r>
-              <a:rPr lang="pl-PL" sz="2400" dirty="0" smtClean="0">
-                <a:latin typeface="Arial"/>
-                <a:ea typeface="Arial"/>
-                <a:cs typeface="Arial"/>
-                <a:sym typeface="Arial"/>
-              </a:rPr>
-              <a:t>Definicja wsp</a:t>
-            </a:r>
-            <a:r>
               <a:rPr lang="pl-PL" sz="2400" dirty="0">
                 <a:latin typeface="Arial"/>
                 <a:ea typeface="Arial"/>
                 <a:cs typeface="Arial"/>
                 <a:sym typeface="Arial"/>
               </a:rPr>
-              <a:t>ó</a:t>
-            </a:r>
-            <a:r>
-              <a:rPr lang="pl-PL" sz="2400" dirty="0" smtClean="0">
-                <a:latin typeface="Arial"/>
-                <a:ea typeface="Arial"/>
-                <a:cs typeface="Arial"/>
-                <a:sym typeface="Arial"/>
-              </a:rPr>
-              <a:t>łprogramu</a:t>
+              <a:t>Definicja współprogramu</a:t>
             </a:r>
           </a:p>
           <a:p>
@@ -7421,7 +7541,7 @@
               <a:buChar char="•"/>
             </a:pPr>
             <a:r>
-              <a:rPr lang="pl-PL" sz="2400" dirty="0" smtClean="0">
+              <a:rPr lang="pl-PL" sz="2400" dirty="0">
                 <a:latin typeface="Arial"/>
                 <a:ea typeface="Arial"/>
                 <a:cs typeface="Arial"/>
@@ -7440,7 +7560,7 @@
               <a:buChar char="•"/>
             </a:pPr>
             <a:r>
-              <a:rPr lang="pl-PL" sz="2400" dirty="0" smtClean="0">
+              <a:rPr lang="pl-PL" sz="2400" dirty="0">
                 <a:latin typeface="Arial"/>
                 <a:ea typeface="Arial"/>
                 <a:cs typeface="Arial"/>
@@ -7459,7 +7579,7 @@
               <a:buChar char="•"/>
             </a:pPr>
             <a:r>
-              <a:rPr lang="pl-PL" sz="2400" dirty="0" smtClean="0">
+              <a:rPr lang="pl-PL" sz="2400" dirty="0">
                 <a:latin typeface="Arial"/>
                 <a:ea typeface="Arial"/>
                 <a:cs typeface="Arial"/>
@@ -7467,12 +7587,6 @@
               </a:rPr>
               <a:t>Efekt końcowy</a:t>
             </a:r>
-            <a:endParaRPr lang="pl-PL" sz="2400" dirty="0">
-              <a:latin typeface="Arial"/>
-              <a:ea typeface="Arial"/>
-              <a:cs typeface="Arial"/>
-              <a:sym typeface="Arial"/>
-            </a:endParaRPr>
           </a:p>
         </p:txBody>
       </p:sp>
@@ -7547,31 +7661,13 @@
               <a:buChar char="•"/>
             </a:pPr>
             <a:r>
-              <a:rPr lang="pl-PL" sz="2400" dirty="0" smtClean="0">
-                <a:latin typeface="Arial"/>
-                <a:ea typeface="Arial"/>
-                <a:cs typeface="Arial"/>
-                <a:sym typeface="Arial"/>
-              </a:rPr>
-              <a:t>Sterowanie w czasie rzeczywistym </a:t>
-            </a:r>
-            <a:r>
               <a:rPr lang="pl-PL" sz="2400" dirty="0">
                 <a:latin typeface="Arial"/>
                 <a:ea typeface="Arial"/>
                 <a:cs typeface="Arial"/>
                 <a:sym typeface="Arial"/>
               </a:rPr>
-              <a:t>silnikiem krokowym poprzez stronę </a:t>
-            </a:r>
-            <a:r>
-              <a:rPr lang="pl-PL" sz="2400" dirty="0" smtClean="0">
-                <a:latin typeface="Arial"/>
-                <a:ea typeface="Arial"/>
-                <a:cs typeface="Arial"/>
-                <a:sym typeface="Arial"/>
-              </a:rPr>
-              <a:t>WWW</a:t>
+              <a:t>Sterowanie w czasie rzeczywistym silnikiem krokowym poprzez stronę WWW</a:t>
             </a:r>
           </a:p>
           <a:p>
@@ -7590,23 +7686,8 @@
                 <a:cs typeface="Arial"/>
                 <a:sym typeface="Arial"/>
               </a:rPr>
-              <a:t>Wykorzystanie mechanizmu współprogramów (coroutines</a:t>
-            </a:r>
-            <a:r>
-              <a:rPr lang="pl-PL" sz="2400" dirty="0" smtClean="0">
-                <a:latin typeface="Arial"/>
-                <a:ea typeface="Arial"/>
-                <a:cs typeface="Arial"/>
-                <a:sym typeface="Arial"/>
-              </a:rPr>
-              <a:t>)</a:t>
-            </a:r>
-            <a:endParaRPr lang="pl-PL" sz="2400" dirty="0">
-              <a:latin typeface="Arial"/>
-              <a:ea typeface="Arial"/>
-              <a:cs typeface="Arial"/>
-              <a:sym typeface="Arial"/>
-            </a:endParaRPr>
+              <a:t>Wykorzystanie mechanizmu współprogramów (coroutines)</a:t>
+            </a:r>
           </a:p>
           <a:p>
             <a:pPr indent="-381000">
@@ -7689,7 +7770,7 @@
               <a:buNone/>
             </a:pPr>
             <a:r>
-              <a:rPr lang="pl-PL" sz="3600" b="1" dirty="0" smtClean="0">
+              <a:rPr lang="pl-PL" sz="3600" b="1" dirty="0">
                 <a:latin typeface="Arial"/>
                 <a:ea typeface="Arial"/>
                 <a:cs typeface="Arial"/>
@@ -7777,7 +7858,7 @@
               <a:buChar char="•"/>
             </a:pPr>
             <a:r>
-              <a:rPr lang="en-US" sz="2400" dirty="0" err="1" smtClean="0">
+              <a:rPr lang="en-US" sz="2400" dirty="0" err="1">
                 <a:latin typeface="Arial"/>
                 <a:ea typeface="Arial"/>
                 <a:cs typeface="Arial"/>
@@ -7786,7 +7867,7 @@
               <a:t>Stworzenie</a:t>
             </a:r>
             <a:r>
-              <a:rPr lang="en-US" sz="2400" dirty="0" smtClean="0">
+              <a:rPr lang="en-US" sz="2400" dirty="0">
                 <a:latin typeface="Arial"/>
                 <a:ea typeface="Arial"/>
                 <a:cs typeface="Arial"/>
@@ -8135,7 +8216,7 @@
               <a:t> </a:t>
             </a:r>
             <a:r>
-              <a:rPr lang="en-US" sz="2400" dirty="0" err="1" smtClean="0">
+              <a:rPr lang="en-US" sz="2400" dirty="0" err="1">
                 <a:latin typeface="Arial"/>
                 <a:ea typeface="Arial"/>
                 <a:cs typeface="Arial"/>
@@ -8144,7 +8225,7 @@
               <a:t>zmienn</a:t>
             </a:r>
             <a:r>
-              <a:rPr lang="pl-PL" sz="2400" dirty="0" err="1" smtClean="0">
+              <a:rPr lang="pl-PL" sz="2400" dirty="0" err="1">
                 <a:latin typeface="Arial"/>
                 <a:ea typeface="Arial"/>
                 <a:cs typeface="Arial"/>
@@ -8153,7 +8234,7 @@
               <a:t>ych</a:t>
             </a:r>
             <a:r>
-              <a:rPr lang="pl-PL" sz="2400" dirty="0" smtClean="0">
+              <a:rPr lang="pl-PL" sz="2400" dirty="0">
                 <a:latin typeface="Arial"/>
                 <a:ea typeface="Arial"/>
                 <a:cs typeface="Arial"/>
@@ -8162,22 +8243,13 @@
               <a:t> globalnych</a:t>
             </a:r>
             <a:r>
-              <a:rPr lang="en-US" sz="2400" dirty="0" smtClean="0">
-                <a:latin typeface="Arial"/>
-                <a:ea typeface="Arial"/>
-                <a:cs typeface="Arial"/>
-                <a:sym typeface="Arial"/>
-              </a:rPr>
-              <a:t>. </a:t>
-            </a:r>
-            <a:r>
               <a:rPr lang="en-US" sz="2400" dirty="0">
                 <a:latin typeface="Arial"/>
                 <a:ea typeface="Arial"/>
                 <a:cs typeface="Arial"/>
                 <a:sym typeface="Arial"/>
               </a:rPr>
-              <a:t>Program WWW </a:t>
+              <a:t>. Program WWW </a:t>
             </a:r>
             <a:r>
               <a:rPr lang="en-US" sz="2400" dirty="0" err="1">
@@ -8198,7 +8270,7 @@
               <a:t> </a:t>
             </a:r>
             <a:r>
-              <a:rPr lang="en-US" sz="2400" dirty="0" err="1" smtClean="0">
+              <a:rPr lang="en-US" sz="2400" dirty="0" err="1">
                 <a:latin typeface="Arial"/>
                 <a:ea typeface="Arial"/>
                 <a:cs typeface="Arial"/>
@@ -8207,7 +8279,7 @@
               <a:t>silnik</a:t>
             </a:r>
             <a:r>
-              <a:rPr lang="en-US" sz="2400" dirty="0" smtClean="0">
+              <a:rPr lang="en-US" sz="2400" dirty="0">
                 <a:latin typeface="Arial"/>
                 <a:ea typeface="Arial"/>
                 <a:cs typeface="Arial"/>
@@ -8216,7 +8288,7 @@
               <a:t> </a:t>
             </a:r>
             <a:r>
-              <a:rPr lang="pl-PL" sz="2400" dirty="0" smtClean="0">
+              <a:rPr lang="pl-PL" sz="2400" dirty="0">
                 <a:latin typeface="Arial"/>
                 <a:ea typeface="Arial"/>
                 <a:cs typeface="Arial"/>
@@ -8225,22 +8297,13 @@
               <a:t>o kierunku obrotu</a:t>
             </a:r>
             <a:r>
-              <a:rPr lang="en-US" sz="2400" dirty="0" smtClean="0">
-                <a:latin typeface="Arial"/>
-                <a:ea typeface="Arial"/>
-                <a:cs typeface="Arial"/>
-                <a:sym typeface="Arial"/>
-              </a:rPr>
-              <a:t>. </a:t>
-            </a:r>
-            <a:r>
               <a:rPr lang="en-US" sz="2400" dirty="0">
                 <a:latin typeface="Arial"/>
                 <a:ea typeface="Arial"/>
                 <a:cs typeface="Arial"/>
                 <a:sym typeface="Arial"/>
               </a:rPr>
-              <a:t>Na </a:t>
+              <a:t>. Na </a:t>
             </a:r>
             <a:r>
               <a:rPr lang="en-US" sz="2400" dirty="0" err="1">
@@ -8315,7 +8378,7 @@
               <a:t> </a:t>
             </a:r>
             <a:r>
-              <a:rPr lang="en-US" sz="2400" dirty="0" err="1" smtClean="0">
+              <a:rPr lang="en-US" sz="2400" dirty="0" err="1">
                 <a:latin typeface="Arial"/>
                 <a:ea typeface="Arial"/>
                 <a:cs typeface="Arial"/>
@@ -8324,7 +8387,7 @@
               <a:t>odnośniki</a:t>
             </a:r>
             <a:r>
-              <a:rPr lang="pl-PL" sz="2400" dirty="0" smtClean="0">
+              <a:rPr lang="pl-PL" sz="2400" dirty="0">
                 <a:latin typeface="Arial"/>
                 <a:ea typeface="Arial"/>
                 <a:cs typeface="Arial"/>
@@ -8333,7 +8396,7 @@
               <a:t>,</a:t>
             </a:r>
             <a:r>
-              <a:rPr lang="en-US" sz="2400" dirty="0" smtClean="0">
+              <a:rPr lang="en-US" sz="2400" dirty="0">
                 <a:latin typeface="Arial"/>
                 <a:ea typeface="Arial"/>
                 <a:cs typeface="Arial"/>
@@ -8360,7 +8423,7 @@
               <a:t> </a:t>
             </a:r>
             <a:r>
-              <a:rPr lang="en-US" sz="2400" dirty="0" err="1" smtClean="0">
+              <a:rPr lang="en-US" sz="2400" dirty="0" err="1">
                 <a:latin typeface="Arial"/>
                 <a:ea typeface="Arial"/>
                 <a:cs typeface="Arial"/>
@@ -8378,7 +8441,7 @@
               <a:t> będzie</a:t>
             </a:r>
             <a:r>
-              <a:rPr lang="en-US" sz="2400" dirty="0" smtClean="0">
+              <a:rPr lang="en-US" sz="2400" dirty="0">
                 <a:latin typeface="Arial"/>
                 <a:ea typeface="Arial"/>
                 <a:cs typeface="Arial"/>
@@ -8387,7 +8450,7 @@
               <a:t> </a:t>
             </a:r>
             <a:r>
-              <a:rPr lang="en-US" sz="2400" dirty="0" err="1" smtClean="0">
+              <a:rPr lang="en-US" sz="2400" dirty="0" err="1">
                 <a:latin typeface="Arial"/>
                 <a:ea typeface="Arial"/>
                 <a:cs typeface="Arial"/>
@@ -8396,7 +8459,7 @@
               <a:t>można</a:t>
             </a:r>
             <a:r>
-              <a:rPr lang="en-US" sz="2400" dirty="0" smtClean="0">
+              <a:rPr lang="en-US" sz="2400" dirty="0">
                 <a:latin typeface="Arial"/>
                 <a:ea typeface="Arial"/>
                 <a:cs typeface="Arial"/>
@@ -8477,7 +8540,7 @@
               <a:t> </a:t>
             </a:r>
             <a:r>
-              <a:rPr lang="en-US" sz="2400" dirty="0" err="1" smtClean="0">
+              <a:rPr lang="en-US" sz="2400" dirty="0" err="1">
                 <a:latin typeface="Arial"/>
                 <a:ea typeface="Arial"/>
                 <a:cs typeface="Arial"/>
@@ -8486,7 +8549,7 @@
               <a:t>silnika</a:t>
             </a:r>
             <a:r>
-              <a:rPr lang="en-US" sz="2400" dirty="0" smtClean="0">
+              <a:rPr lang="en-US" sz="2400" dirty="0">
                 <a:latin typeface="Arial"/>
                 <a:ea typeface="Arial"/>
                 <a:cs typeface="Arial"/>
@@ -8494,7 +8557,7 @@
               </a:rPr>
               <a:t>.</a:t>
             </a:r>
-            <a:endParaRPr lang="pl-PL" sz="2400" dirty="0" smtClean="0">
+            <a:endParaRPr lang="pl-PL" sz="2400" dirty="0">
               <a:latin typeface="Arial"/>
               <a:ea typeface="Arial"/>
               <a:cs typeface="Arial"/>
@@ -8514,7 +8577,7 @@
               <a:buChar char="•"/>
             </a:pPr>
             <a:r>
-              <a:rPr lang="pl-PL" sz="2400" dirty="0" smtClean="0">
+              <a:rPr lang="pl-PL" sz="2400" dirty="0">
                 <a:latin typeface="Arial"/>
                 <a:ea typeface="Arial"/>
                 <a:cs typeface="Arial"/>
@@ -8588,7 +8651,7 @@
               <a:buNone/>
             </a:pPr>
             <a:r>
-              <a:rPr lang="pl-PL" sz="3600" b="1" dirty="0" smtClean="0">
+              <a:rPr lang="pl-PL" sz="3600" b="1" dirty="0">
                 <a:latin typeface="Arial"/>
                 <a:ea typeface="Arial"/>
                 <a:cs typeface="Arial"/>
@@ -8668,7 +8731,7 @@
               <a:buChar char="•"/>
             </a:pPr>
             <a:r>
-              <a:rPr lang="pl-PL" sz="2400" dirty="0" smtClean="0">
+              <a:rPr lang="pl-PL" sz="2400" dirty="0">
                 <a:solidFill>
                   <a:srgbClr val="000000"/>
                 </a:solidFill>
@@ -8677,7 +8740,19 @@
                 <a:cs typeface="Arial"/>
                 <a:sym typeface="Arial"/>
               </a:rPr>
-              <a:t>Współprogram </a:t>
+              <a:t>Współprogram cechuje się posiadaniem ciągu instrukcji do wykonania i ponadto możliwością zawieszania wykonywania jednego współprogramu </a:t>
+            </a:r>
+            <a:r>
+              <a:rPr lang="pl-PL" sz="2400" i="1" dirty="0">
+                <a:solidFill>
+                  <a:srgbClr val="000000"/>
+                </a:solidFill>
+                <a:latin typeface="Arial"/>
+                <a:ea typeface="Arial"/>
+                <a:cs typeface="Arial"/>
+                <a:sym typeface="Arial"/>
+              </a:rPr>
+              <a:t>A</a:t>
             </a:r>
             <a:r>
               <a:rPr lang="pl-PL" sz="2400" dirty="0">
@@ -8689,7 +8764,7 @@
                 <a:cs typeface="Arial"/>
                 <a:sym typeface="Arial"/>
               </a:rPr>
-              <a:t>cechuje się posiadaniem ciągu instrukcji do wykonania i ponadto możliwością zawieszania wykonywania jednego współprogramu </a:t>
+              <a:t> i przenoszenia wykonywania do innego współprogramu </a:t>
             </a:r>
             <a:r>
               <a:rPr lang="pl-PL" sz="2400" i="1" dirty="0">
@@ -8701,7 +8776,7 @@
                 <a:cs typeface="Arial"/>
                 <a:sym typeface="Arial"/>
               </a:rPr>
-              <a:t>A</a:t>
+              <a:t>B</a:t>
             </a:r>
             <a:r>
               <a:rPr lang="pl-PL" sz="2400" dirty="0">
@@ -8713,41 +8788,8 @@
                 <a:cs typeface="Arial"/>
                 <a:sym typeface="Arial"/>
               </a:rPr>
-              <a:t> i przenoszenia wykonywania do innego współprogramu </a:t>
-            </a:r>
-            <a:r>
-              <a:rPr lang="pl-PL" sz="2400" i="1" dirty="0">
-                <a:solidFill>
-                  <a:srgbClr val="000000"/>
-                </a:solidFill>
-                <a:latin typeface="Arial"/>
-                <a:ea typeface="Arial"/>
-                <a:cs typeface="Arial"/>
-                <a:sym typeface="Arial"/>
-              </a:rPr>
-              <a:t>B</a:t>
-            </a:r>
-            <a:r>
-              <a:rPr lang="pl-PL" sz="2400" dirty="0">
-                <a:solidFill>
-                  <a:srgbClr val="000000"/>
-                </a:solidFill>
-                <a:latin typeface="Arial"/>
-                <a:ea typeface="Arial"/>
-                <a:cs typeface="Arial"/>
-                <a:sym typeface="Arial"/>
-              </a:rPr>
               <a:t>. </a:t>
             </a:r>
-            <a:endParaRPr lang="pl-PL" sz="2400" dirty="0" smtClean="0">
-              <a:solidFill>
-                <a:srgbClr val="000000"/>
-              </a:solidFill>
-              <a:latin typeface="Arial"/>
-              <a:ea typeface="Arial"/>
-              <a:cs typeface="Arial"/>
-              <a:sym typeface="Arial"/>
-            </a:endParaRPr>
           </a:p>
           <a:p>
             <a:pPr lvl="0" indent="-381000" algn="just">
@@ -8759,7 +8801,7 @@
               <a:buChar char="•"/>
             </a:pPr>
             <a:r>
-              <a:rPr lang="pl-PL" sz="2400" dirty="0" smtClean="0">
+              <a:rPr lang="pl-PL" sz="2400" dirty="0">
                 <a:latin typeface="Arial"/>
                 <a:ea typeface="Arial"/>
                 <a:cs typeface="Arial"/>
@@ -8768,7 +8810,7 @@
               <a:t>W języku </a:t>
             </a:r>
             <a:r>
-              <a:rPr lang="pl-PL" sz="2400" dirty="0" err="1" smtClean="0">
+              <a:rPr lang="pl-PL" sz="2400" dirty="0" err="1">
                 <a:latin typeface="Arial"/>
                 <a:ea typeface="Arial"/>
                 <a:cs typeface="Arial"/>
@@ -8777,85 +8819,13 @@
               <a:t>Python</a:t>
             </a:r>
             <a:r>
-              <a:rPr lang="pl-PL" sz="2400" dirty="0" smtClean="0">
-                <a:latin typeface="Arial"/>
-                <a:ea typeface="Arial"/>
-                <a:cs typeface="Arial"/>
-                <a:sym typeface="Arial"/>
-              </a:rPr>
-              <a:t> współprogram jest uogólnieniem podprogramu</a:t>
-            </a:r>
-            <a:r>
               <a:rPr lang="pl-PL" sz="2400" dirty="0">
                 <a:latin typeface="Arial"/>
                 <a:ea typeface="Arial"/>
                 <a:cs typeface="Arial"/>
                 <a:sym typeface="Arial"/>
               </a:rPr>
-              <a:t>. </a:t>
-            </a:r>
-            <a:r>
-              <a:rPr lang="pl-PL" sz="2400" dirty="0" smtClean="0">
-                <a:latin typeface="Arial"/>
-                <a:ea typeface="Arial"/>
-                <a:cs typeface="Arial"/>
-                <a:sym typeface="Arial"/>
-              </a:rPr>
-              <a:t>Jest on używany </a:t>
-            </a:r>
-            <a:r>
-              <a:rPr lang="pl-PL" sz="2400" dirty="0">
-                <a:latin typeface="Arial"/>
-                <a:ea typeface="Arial"/>
-                <a:cs typeface="Arial"/>
-                <a:sym typeface="Arial"/>
-              </a:rPr>
-              <a:t>do wielozadaniowej współpracy, w której proces dobrowolnie </a:t>
-            </a:r>
-            <a:r>
-              <a:rPr lang="pl-PL" sz="2400" dirty="0" smtClean="0">
-                <a:latin typeface="Arial"/>
-                <a:ea typeface="Arial"/>
-                <a:cs typeface="Arial"/>
-                <a:sym typeface="Arial"/>
-              </a:rPr>
-              <a:t>oddaje </a:t>
-            </a:r>
-            <a:r>
-              <a:rPr lang="pl-PL" sz="2400" dirty="0">
-                <a:latin typeface="Arial"/>
-                <a:ea typeface="Arial"/>
-                <a:cs typeface="Arial"/>
-                <a:sym typeface="Arial"/>
-              </a:rPr>
-              <a:t>kontrolę </a:t>
-            </a:r>
-            <a:r>
-              <a:rPr lang="pl-PL" sz="2400" dirty="0" smtClean="0">
-                <a:latin typeface="Arial"/>
-                <a:ea typeface="Arial"/>
-                <a:cs typeface="Arial"/>
-                <a:sym typeface="Arial"/>
-              </a:rPr>
-              <a:t>okresowo </a:t>
-            </a:r>
-            <a:r>
-              <a:rPr lang="pl-PL" sz="2400" dirty="0">
-                <a:latin typeface="Arial"/>
-                <a:ea typeface="Arial"/>
-                <a:cs typeface="Arial"/>
-                <a:sym typeface="Arial"/>
-              </a:rPr>
-              <a:t>aby umożliwić jednoczesne uruchamianie wielu aplikacji</a:t>
-            </a:r>
-            <a:r>
-              <a:rPr lang="pl-PL" sz="2400" dirty="0" smtClean="0">
-                <a:latin typeface="Arial"/>
-                <a:ea typeface="Arial"/>
-                <a:cs typeface="Arial"/>
-                <a:sym typeface="Arial"/>
-              </a:rPr>
-              <a:t>.</a:t>
+              <a:t> współprogram jest uogólnieniem podprogramu. Jest on używany do wielozadaniowej współpracy, w której proces dobrowolnie oddaje kontrolę okresowo aby umożliwić jednoczesne uruchamianie wielu aplikacji.</a:t>
             </a:r>
           </a:p>
           <a:p>
@@ -8868,31 +8838,13 @@
               <a:buChar char="•"/>
             </a:pPr>
             <a:r>
-              <a:rPr lang="pl-PL" sz="2400" dirty="0" smtClean="0">
-                <a:latin typeface="Arial"/>
-                <a:ea typeface="Arial"/>
-                <a:cs typeface="Arial"/>
-                <a:sym typeface="Arial"/>
-              </a:rPr>
-              <a:t>Współprogram </a:t>
-            </a:r>
-            <a:r>
               <a:rPr lang="pl-PL" sz="2400" dirty="0">
                 <a:latin typeface="Arial"/>
                 <a:ea typeface="Arial"/>
                 <a:cs typeface="Arial"/>
                 <a:sym typeface="Arial"/>
               </a:rPr>
-              <a:t>może zawiesić swoje wykonanie i przekazać kontrolę do innego modułu i może wznowić wykonywanie od miejsca, w którym zostało </a:t>
-            </a:r>
-            <a:r>
-              <a:rPr lang="pl-PL" sz="2400" dirty="0" smtClean="0">
-                <a:latin typeface="Arial"/>
-                <a:ea typeface="Arial"/>
-                <a:cs typeface="Arial"/>
-                <a:sym typeface="Arial"/>
-              </a:rPr>
-              <a:t>przerwane. </a:t>
+              <a:t>Współprogram może zawiesić swoje wykonanie i przekazać kontrolę do innego modułu i może wznowić wykonywanie od miejsca, w którym zostało przerwane. </a:t>
             </a:r>
           </a:p>
         </p:txBody>
@@ -8941,7 +8893,7 @@
               <a:buNone/>
             </a:pPr>
             <a:r>
-              <a:rPr lang="pl-PL" sz="3600" b="1" dirty="0" smtClean="0">
+              <a:rPr lang="pl-PL" sz="3600" b="1" dirty="0">
                 <a:latin typeface="Arial"/>
                 <a:ea typeface="Arial"/>
                 <a:cs typeface="Arial"/>
@@ -8950,7 +8902,7 @@
               <a:t>Współprogram w </a:t>
             </a:r>
             <a:r>
-              <a:rPr lang="pl-PL" sz="3600" b="1" dirty="0" err="1" smtClean="0">
+              <a:rPr lang="pl-PL" sz="3600" b="1" dirty="0" err="1">
                 <a:latin typeface="Arial"/>
                 <a:ea typeface="Arial"/>
                 <a:cs typeface="Arial"/>
@@ -9117,16 +9069,7 @@
                 <a:cs typeface="Arial"/>
                 <a:sym typeface="Arial"/>
               </a:rPr>
-              <a:t> 28BYJ-48 5VDC + sterownik </a:t>
-            </a:r>
-            <a:r>
-              <a:rPr lang="en-US" sz="2400" dirty="0" smtClean="0">
-                <a:latin typeface="Arial"/>
-                <a:ea typeface="Arial"/>
-                <a:cs typeface="Arial"/>
-                <a:sym typeface="Arial"/>
-              </a:rPr>
-              <a:t>ULN2003</a:t>
+              <a:t> 28BYJ-48 5VDC + sterownik ULN2003</a:t>
             </a:r>
             <a:endParaRPr sz="2400" dirty="0">
               <a:latin typeface="Arial"/>
@@ -9181,7 +9124,7 @@
               <a:buNone/>
             </a:pPr>
             <a:r>
-              <a:rPr lang="pl-PL" sz="3600" b="1" dirty="0" smtClean="0">
+              <a:rPr lang="pl-PL" sz="3600" b="1" dirty="0">
                 <a:latin typeface="Arial"/>
                 <a:ea typeface="Arial"/>
                 <a:cs typeface="Arial"/>
@@ -9528,17 +9471,11 @@
               <a:rPr lang="pl-PL" sz="3600" b="1" dirty="0">
                 <a:latin typeface="+mj-lt"/>
               </a:rPr>
-              <a:t>Silnik krokowy </a:t>
-            </a:r>
-            <a:r>
-              <a:rPr lang="pl-PL" sz="3600" b="1" dirty="0" smtClean="0">
+              <a:t>Silnik krokowy 28BYJ-48 i </a:t>
+            </a:r>
+            <a:r>
+              <a:rPr lang="en-US" sz="3600" b="1" dirty="0">
                 <a:latin typeface="+mj-lt"/>
-              </a:rPr>
-              <a:t>28BYJ-48 i </a:t>
-            </a:r>
-            <a:r>
-              <a:rPr lang="en-US" sz="3600" b="1" dirty="0" smtClean="0">
-                <a:latin typeface="+mj-lt"/>
                 <a:ea typeface="Arial"/>
                 <a:cs typeface="Arial"/>
                 <a:sym typeface="Arial"/>
@@ -9546,7 +9483,7 @@
               <a:t>sterownik ULN200</a:t>
             </a:r>
             <a:r>
-              <a:rPr lang="pl-PL" sz="3600" b="1" dirty="0" smtClean="0">
+              <a:rPr lang="pl-PL" sz="3600" b="1" dirty="0">
                 <a:latin typeface="+mj-lt"/>
                 <a:ea typeface="Arial"/>
                 <a:cs typeface="Arial"/>
@@ -9643,7 +9580,6 @@
               <a:rPr lang="pl-PL" sz="2000" dirty="0"/>
               <a:t>Moment trzymający na wyjściu </a:t>
             </a:r>
-            <a:endParaRPr lang="pl-PL" sz="2000" dirty="0" smtClean="0"/>
           </a:p>
           <a:p>
             <a:pPr marL="285750" indent="-285750">
@@ -9651,12 +9587,8 @@
               <a:buChar char="•"/>
             </a:pPr>
             <a:r>
-              <a:rPr lang="pl-PL" sz="2000" dirty="0" smtClean="0"/>
-              <a:t>przekładni</a:t>
-            </a:r>
-            <a:r>
               <a:rPr lang="pl-PL" sz="2000" dirty="0"/>
-              <a:t>: 0,03 </a:t>
+              <a:t>przekładni: 0,03 </a:t>
             </a:r>
             <a:r>
               <a:rPr lang="pl-PL" sz="2000" dirty="0" err="1"/>
@@ -9671,11 +9603,7 @@
             </a:pPr>
             <a:r>
               <a:rPr lang="pl-PL" sz="2000" dirty="0"/>
-              <a:t>Pięć </a:t>
-            </a:r>
-            <a:r>
-              <a:rPr lang="pl-PL" sz="2000" dirty="0" smtClean="0"/>
-              <a:t>wyprowadzeń</a:t>
+              <a:t>Pięć wyprowadzeń</a:t>
             </a:r>
           </a:p>
           <a:p>
@@ -9745,22 +9673,13 @@
               <a:buChar char="•"/>
             </a:pPr>
             <a:r>
-              <a:rPr lang="pl-PL" sz="2000" dirty="0" smtClean="0">
+              <a:rPr lang="pl-PL" sz="2000" dirty="0">
                 <a:solidFill>
                   <a:srgbClr val="222222"/>
                 </a:solidFill>
                 <a:latin typeface="+mj-lt"/>
               </a:rPr>
-              <a:t>Diody </a:t>
-            </a:r>
-            <a:r>
-              <a:rPr lang="pl-PL" sz="2000" dirty="0">
-                <a:solidFill>
-                  <a:srgbClr val="222222"/>
-                </a:solidFill>
-                <a:latin typeface="+mj-lt"/>
-              </a:rPr>
-              <a:t>LED wskazujące aktualną fazę</a:t>
+              <a:t>Diody LED wskazujące aktualną fazę</a:t>
             </a:r>
           </a:p>
           <a:p>
@@ -9911,7 +9830,341 @@
             <a:pPr marL="50800" indent="0">
               <a:buNone/>
             </a:pPr>
-            <a:endParaRPr lang="pl-PL" dirty="0"/>
+            <a:r>
+              <a:rPr lang="pl-PL" b="1" dirty="0"/>
+              <a:t>Front-end</a:t>
+            </a:r>
+          </a:p>
+          <a:p>
+            <a:pPr marL="50800" indent="0">
+              <a:buNone/>
+            </a:pPr>
+            <a:r>
+              <a:rPr lang="pl-PL" sz="1800" dirty="0" err="1">
+                <a:solidFill>
+                  <a:srgbClr val="00B0F0"/>
+                </a:solidFill>
+                <a:latin typeface="Lucida Console" panose="020B0609040504020204" pitchFamily="49" charset="0"/>
+              </a:rPr>
+              <a:t>function</a:t>
+            </a:r>
+            <a:r>
+              <a:rPr lang="pl-PL" sz="1800" dirty="0">
+                <a:latin typeface="Lucida Console" panose="020B0609040504020204" pitchFamily="49" charset="0"/>
+              </a:rPr>
+              <a:t> </a:t>
+            </a:r>
+            <a:r>
+              <a:rPr lang="pl-PL" sz="1800" dirty="0" err="1">
+                <a:solidFill>
+                  <a:srgbClr val="92D050"/>
+                </a:solidFill>
+                <a:latin typeface="Lucida Console" panose="020B0609040504020204" pitchFamily="49" charset="0"/>
+              </a:rPr>
+              <a:t>funName</a:t>
+            </a:r>
+            <a:r>
+              <a:rPr lang="pl-PL" sz="1800" dirty="0">
+                <a:latin typeface="Lucida Console" panose="020B0609040504020204" pitchFamily="49" charset="0"/>
+              </a:rPr>
+              <a:t>(</a:t>
+            </a:r>
+            <a:r>
+              <a:rPr lang="pl-PL" sz="1800" dirty="0">
+                <a:solidFill>
+                  <a:srgbClr val="FFC000"/>
+                </a:solidFill>
+                <a:latin typeface="Lucida Console" panose="020B0609040504020204" pitchFamily="49" charset="0"/>
+              </a:rPr>
+              <a:t>argument</a:t>
+            </a:r>
+            <a:r>
+              <a:rPr lang="pl-PL" sz="1800" dirty="0">
+                <a:latin typeface="Lucida Console" panose="020B0609040504020204" pitchFamily="49" charset="0"/>
+              </a:rPr>
+              <a:t>){</a:t>
+            </a:r>
+          </a:p>
+          <a:p>
+            <a:pPr marL="50800" indent="0">
+              <a:buNone/>
+            </a:pPr>
+            <a:r>
+              <a:rPr lang="pl-PL" sz="1800" dirty="0">
+                <a:latin typeface="Lucida Console" panose="020B0609040504020204" pitchFamily="49" charset="0"/>
+              </a:rPr>
+              <a:t>	</a:t>
+            </a:r>
+            <a:r>
+              <a:rPr lang="pl-PL" sz="1800" dirty="0" err="1">
+                <a:solidFill>
+                  <a:srgbClr val="00B0F0"/>
+                </a:solidFill>
+                <a:latin typeface="Lucida Console" panose="020B0609040504020204" pitchFamily="49" charset="0"/>
+              </a:rPr>
+              <a:t>let</a:t>
+            </a:r>
+            <a:r>
+              <a:rPr lang="pl-PL" sz="1800" dirty="0">
+                <a:latin typeface="Lucida Console" panose="020B0609040504020204" pitchFamily="49" charset="0"/>
+              </a:rPr>
+              <a:t> </a:t>
+            </a:r>
+            <a:r>
+              <a:rPr lang="pl-PL" sz="1800" dirty="0" err="1">
+                <a:latin typeface="Lucida Console" panose="020B0609040504020204" pitchFamily="49" charset="0"/>
+              </a:rPr>
+              <a:t>req</a:t>
+            </a:r>
+            <a:r>
+              <a:rPr lang="pl-PL" sz="1800" dirty="0">
+                <a:latin typeface="Lucida Console" panose="020B0609040504020204" pitchFamily="49" charset="0"/>
+              </a:rPr>
+              <a:t> = </a:t>
+            </a:r>
+            <a:r>
+              <a:rPr lang="pl-PL" sz="1800" dirty="0" err="1">
+                <a:solidFill>
+                  <a:srgbClr val="FF0066"/>
+                </a:solidFill>
+                <a:latin typeface="Lucida Console" panose="020B0609040504020204" pitchFamily="49" charset="0"/>
+              </a:rPr>
+              <a:t>new</a:t>
+            </a:r>
+            <a:r>
+              <a:rPr lang="pl-PL" sz="1800" dirty="0">
+                <a:latin typeface="Lucida Console" panose="020B0609040504020204" pitchFamily="49" charset="0"/>
+              </a:rPr>
+              <a:t> </a:t>
+            </a:r>
+            <a:r>
+              <a:rPr lang="pl-PL" sz="1800" i="1" dirty="0" err="1">
+                <a:solidFill>
+                  <a:srgbClr val="00B0F0"/>
+                </a:solidFill>
+                <a:latin typeface="Lucida Console" panose="020B0609040504020204" pitchFamily="49" charset="0"/>
+              </a:rPr>
+              <a:t>XMLHttpRequest</a:t>
+            </a:r>
+            <a:r>
+              <a:rPr lang="pl-PL" sz="1800" dirty="0">
+                <a:latin typeface="Lucida Console" panose="020B0609040504020204" pitchFamily="49" charset="0"/>
+              </a:rPr>
+              <a:t>();</a:t>
+            </a:r>
+          </a:p>
+          <a:p>
+            <a:pPr marL="50800" indent="0">
+              <a:buNone/>
+            </a:pPr>
+            <a:r>
+              <a:rPr lang="pl-PL" sz="1800" dirty="0">
+                <a:latin typeface="Lucida Console" panose="020B0609040504020204" pitchFamily="49" charset="0"/>
+              </a:rPr>
+              <a:t>  	</a:t>
+            </a:r>
+            <a:r>
+              <a:rPr lang="pl-PL" sz="1800" dirty="0" err="1">
+                <a:latin typeface="Lucida Console" panose="020B0609040504020204" pitchFamily="49" charset="0"/>
+              </a:rPr>
+              <a:t>req.</a:t>
+            </a:r>
+            <a:r>
+              <a:rPr lang="pl-PL" sz="1800" dirty="0" err="1">
+                <a:solidFill>
+                  <a:srgbClr val="00B0F0"/>
+                </a:solidFill>
+                <a:latin typeface="Lucida Console" panose="020B0609040504020204" pitchFamily="49" charset="0"/>
+              </a:rPr>
+              <a:t>open</a:t>
+            </a:r>
+            <a:r>
+              <a:rPr lang="pl-PL" sz="1800" dirty="0">
+                <a:latin typeface="Lucida Console" panose="020B0609040504020204" pitchFamily="49" charset="0"/>
+              </a:rPr>
+              <a:t>("POST", "</a:t>
+            </a:r>
+            <a:r>
+              <a:rPr lang="pl-PL" sz="1800" dirty="0" err="1">
+                <a:latin typeface="Lucida Console" panose="020B0609040504020204" pitchFamily="49" charset="0"/>
+              </a:rPr>
+              <a:t>tu_slij</a:t>
+            </a:r>
+            <a:r>
+              <a:rPr lang="pl-PL" sz="1800" dirty="0">
+                <a:latin typeface="Lucida Console" panose="020B0609040504020204" pitchFamily="49" charset="0"/>
+              </a:rPr>
+              <a:t>", </a:t>
+            </a:r>
+            <a:r>
+              <a:rPr lang="pl-PL" sz="1800" dirty="0" err="1">
+                <a:latin typeface="Lucida Console" panose="020B0609040504020204" pitchFamily="49" charset="0"/>
+              </a:rPr>
+              <a:t>true</a:t>
+            </a:r>
+            <a:r>
+              <a:rPr lang="pl-PL" sz="1800" dirty="0">
+                <a:latin typeface="Lucida Console" panose="020B0609040504020204" pitchFamily="49" charset="0"/>
+              </a:rPr>
+              <a:t>);</a:t>
+            </a:r>
+          </a:p>
+          <a:p>
+            <a:pPr marL="50800" indent="0">
+              <a:buNone/>
+            </a:pPr>
+            <a:r>
+              <a:rPr lang="pl-PL" sz="1800" dirty="0">
+                <a:latin typeface="Lucida Console" panose="020B0609040504020204" pitchFamily="49" charset="0"/>
+              </a:rPr>
+              <a:t>  	</a:t>
+            </a:r>
+            <a:r>
+              <a:rPr lang="pl-PL" sz="1800" dirty="0" err="1">
+                <a:solidFill>
+                  <a:srgbClr val="00B0F0"/>
+                </a:solidFill>
+                <a:latin typeface="Lucida Console" panose="020B0609040504020204" pitchFamily="49" charset="0"/>
+              </a:rPr>
+              <a:t>var</a:t>
+            </a:r>
+            <a:r>
+              <a:rPr lang="pl-PL" sz="1800" dirty="0">
+                <a:latin typeface="Lucida Console" panose="020B0609040504020204" pitchFamily="49" charset="0"/>
+              </a:rPr>
+              <a:t> </a:t>
+            </a:r>
+            <a:r>
+              <a:rPr lang="pl-PL" sz="1800" dirty="0" err="1">
+                <a:latin typeface="Lucida Console" panose="020B0609040504020204" pitchFamily="49" charset="0"/>
+              </a:rPr>
+              <a:t>mySuperVar</a:t>
+            </a:r>
+            <a:r>
+              <a:rPr lang="pl-PL" sz="1800" dirty="0">
+                <a:latin typeface="Lucida Console" panose="020B0609040504020204" pitchFamily="49" charset="0"/>
+              </a:rPr>
+              <a:t> = "Hello World 2.0";</a:t>
+            </a:r>
+          </a:p>
+          <a:p>
+            <a:pPr marL="50800" indent="0">
+              <a:buNone/>
+            </a:pPr>
+            <a:r>
+              <a:rPr lang="pl-PL" sz="1800" dirty="0">
+                <a:latin typeface="Lucida Console" panose="020B0609040504020204" pitchFamily="49" charset="0"/>
+              </a:rPr>
+              <a:t>	</a:t>
+            </a:r>
+            <a:r>
+              <a:rPr lang="pl-PL" sz="1800" dirty="0">
+                <a:solidFill>
+                  <a:schemeClr val="bg1">
+                    <a:lumMod val="50000"/>
+                  </a:schemeClr>
+                </a:solidFill>
+                <a:latin typeface="Lucida Console" panose="020B0609040504020204" pitchFamily="49" charset="0"/>
+              </a:rPr>
+              <a:t>//...</a:t>
+            </a:r>
+          </a:p>
+          <a:p>
+            <a:pPr marL="50800" indent="0">
+              <a:buNone/>
+            </a:pPr>
+            <a:r>
+              <a:rPr lang="pl-PL" sz="1800" dirty="0">
+                <a:latin typeface="Lucida Console" panose="020B0609040504020204" pitchFamily="49" charset="0"/>
+              </a:rPr>
+              <a:t>	</a:t>
+            </a:r>
+            <a:r>
+              <a:rPr lang="pl-PL" sz="1800" dirty="0" err="1">
+                <a:latin typeface="Lucida Console" panose="020B0609040504020204" pitchFamily="49" charset="0"/>
+              </a:rPr>
+              <a:t>req.</a:t>
+            </a:r>
+            <a:r>
+              <a:rPr lang="pl-PL" sz="1800" dirty="0" err="1">
+                <a:solidFill>
+                  <a:srgbClr val="00B0F0"/>
+                </a:solidFill>
+                <a:latin typeface="Lucida Console" panose="020B0609040504020204" pitchFamily="49" charset="0"/>
+              </a:rPr>
+              <a:t>send</a:t>
+            </a:r>
+            <a:r>
+              <a:rPr lang="pl-PL" sz="1800" dirty="0">
+                <a:latin typeface="Lucida Console" panose="020B0609040504020204" pitchFamily="49" charset="0"/>
+              </a:rPr>
+              <a:t>(</a:t>
+            </a:r>
+            <a:r>
+              <a:rPr lang="pl-PL" sz="1800" dirty="0" err="1">
+                <a:solidFill>
+                  <a:srgbClr val="00B0F0"/>
+                </a:solidFill>
+                <a:latin typeface="Lucida Console" panose="020B0609040504020204" pitchFamily="49" charset="0"/>
+              </a:rPr>
+              <a:t>JSON</a:t>
+            </a:r>
+            <a:r>
+              <a:rPr lang="pl-PL" sz="1800" dirty="0" err="1">
+                <a:latin typeface="Lucida Console" panose="020B0609040504020204" pitchFamily="49" charset="0"/>
+              </a:rPr>
+              <a:t>.</a:t>
+            </a:r>
+            <a:r>
+              <a:rPr lang="pl-PL" sz="1800" dirty="0" err="1">
+                <a:solidFill>
+                  <a:srgbClr val="00B0F0"/>
+                </a:solidFill>
+                <a:latin typeface="Lucida Console" panose="020B0609040504020204" pitchFamily="49" charset="0"/>
+              </a:rPr>
+              <a:t>stringify</a:t>
+            </a:r>
+            <a:r>
+              <a:rPr lang="pl-PL" sz="1800" dirty="0">
+                <a:latin typeface="Lucida Console" panose="020B0609040504020204" pitchFamily="49" charset="0"/>
+              </a:rPr>
+              <a:t>({</a:t>
+            </a:r>
+            <a:r>
+              <a:rPr lang="pl-PL" sz="1800" dirty="0" err="1">
+                <a:latin typeface="Lucida Console" panose="020B0609040504020204" pitchFamily="49" charset="0"/>
+              </a:rPr>
+              <a:t>myTxt</a:t>
+            </a:r>
+            <a:r>
+              <a:rPr lang="pl-PL" sz="1800" dirty="0">
+                <a:latin typeface="Lucida Console" panose="020B0609040504020204" pitchFamily="49" charset="0"/>
+              </a:rPr>
+              <a:t>: </a:t>
+            </a:r>
+            <a:r>
+              <a:rPr lang="pl-PL" sz="1800" dirty="0" err="1">
+                <a:latin typeface="Lucida Console" panose="020B0609040504020204" pitchFamily="49" charset="0"/>
+              </a:rPr>
+              <a:t>mySuperVar</a:t>
+            </a:r>
+            <a:r>
+              <a:rPr lang="pl-PL" sz="1800" dirty="0">
+                <a:latin typeface="Lucida Console" panose="020B0609040504020204" pitchFamily="49" charset="0"/>
+              </a:rPr>
+              <a:t>}))   </a:t>
+            </a:r>
+          </a:p>
+          <a:p>
+            <a:pPr marL="50800" indent="0">
+              <a:buNone/>
+            </a:pPr>
+            <a:r>
+              <a:rPr lang="pl-PL" sz="1800" dirty="0">
+                <a:latin typeface="Lucida Console" panose="020B0609040504020204" pitchFamily="49" charset="0"/>
+              </a:rPr>
+              <a:t>  }}</a:t>
+            </a:r>
           </a:p>
         </p:txBody>
       </p:sp>
@@ -9937,10 +10190,9 @@
           <a:p>
             <a:pPr algn="ctr"/>
             <a:r>
-              <a:rPr lang="pl-PL" dirty="0" smtClean="0"/>
+              <a:rPr lang="pl-PL" dirty="0"/>
               <a:t>Oprogramowanie</a:t>
             </a:r>
-            <a:endParaRPr lang="pl-PL" dirty="0"/>
           </a:p>
         </p:txBody>
       </p:sp>

</xml_diff>